<commit_message>
Revise Tock Overview for tutorial page
</commit_message>
<xml_diff>
--- a/assets/tockworld6/tock_tutorial_2023_overview.pptx
+++ b/assets/tockworld6/tock_tutorial_2023_overview.pptx
@@ -219,7 +219,7 @@
           <a:p>
             <a:fld id="{00EAB56B-E041-514D-97D2-6F75E33EBDB8}" type="datetimeFigureOut">
               <a:rPr lang="en-US" smtClean="0"/>
-              <a:t>7/26/23</a:t>
+              <a:t>7/27/23</a:t>
             </a:fld>
             <a:endParaRPr lang="en-US"/>
           </a:p>
@@ -784,7 +784,7 @@
           <a:p>
             <a:fld id="{D3A355B2-7500-CE40-A57A-2B06713DAC87}" type="datetimeFigureOut">
               <a:rPr lang="en-US" smtClean="0"/>
-              <a:t>7/26/23</a:t>
+              <a:t>7/27/23</a:t>
             </a:fld>
             <a:endParaRPr lang="en-US"/>
           </a:p>
@@ -984,7 +984,7 @@
           <a:p>
             <a:fld id="{D3A355B2-7500-CE40-A57A-2B06713DAC87}" type="datetimeFigureOut">
               <a:rPr lang="en-US" smtClean="0"/>
-              <a:t>7/26/23</a:t>
+              <a:t>7/27/23</a:t>
             </a:fld>
             <a:endParaRPr lang="en-US"/>
           </a:p>
@@ -1194,7 +1194,7 @@
           <a:p>
             <a:fld id="{D3A355B2-7500-CE40-A57A-2B06713DAC87}" type="datetimeFigureOut">
               <a:rPr lang="en-US" smtClean="0"/>
-              <a:t>7/26/23</a:t>
+              <a:t>7/27/23</a:t>
             </a:fld>
             <a:endParaRPr lang="en-US"/>
           </a:p>
@@ -1413,7 +1413,7 @@
           <a:p>
             <a:fld id="{D3A355B2-7500-CE40-A57A-2B06713DAC87}" type="datetimeFigureOut">
               <a:rPr lang="en-US" smtClean="0"/>
-              <a:t>7/26/23</a:t>
+              <a:t>7/27/23</a:t>
             </a:fld>
             <a:endParaRPr lang="en-US"/>
           </a:p>
@@ -1746,7 +1746,7 @@
           <a:p>
             <a:fld id="{D3A355B2-7500-CE40-A57A-2B06713DAC87}" type="datetimeFigureOut">
               <a:rPr lang="en-US" smtClean="0"/>
-              <a:t>7/26/23</a:t>
+              <a:t>7/27/23</a:t>
             </a:fld>
             <a:endParaRPr lang="en-US"/>
           </a:p>
@@ -1985,7 +1985,7 @@
           <a:p>
             <a:fld id="{D3A355B2-7500-CE40-A57A-2B06713DAC87}" type="datetimeFigureOut">
               <a:rPr lang="en-US" smtClean="0"/>
-              <a:t>7/26/23</a:t>
+              <a:t>7/27/23</a:t>
             </a:fld>
             <a:endParaRPr lang="en-US"/>
           </a:p>
@@ -2466,7 +2466,7 @@
           <a:p>
             <a:fld id="{D3A355B2-7500-CE40-A57A-2B06713DAC87}" type="datetimeFigureOut">
               <a:rPr lang="en-US" smtClean="0"/>
-              <a:t>7/26/23</a:t>
+              <a:t>7/27/23</a:t>
             </a:fld>
             <a:endParaRPr lang="en-US"/>
           </a:p>
@@ -2679,7 +2679,7 @@
           <a:p>
             <a:fld id="{D3A355B2-7500-CE40-A57A-2B06713DAC87}" type="datetimeFigureOut">
               <a:rPr lang="en-US" smtClean="0"/>
-              <a:t>7/26/23</a:t>
+              <a:t>7/27/23</a:t>
             </a:fld>
             <a:endParaRPr lang="en-US"/>
           </a:p>
@@ -2892,7 +2892,7 @@
           <a:p>
             <a:fld id="{D3A355B2-7500-CE40-A57A-2B06713DAC87}" type="datetimeFigureOut">
               <a:rPr lang="en-US" smtClean="0"/>
-              <a:t>7/26/23</a:t>
+              <a:t>7/27/23</a:t>
             </a:fld>
             <a:endParaRPr lang="en-US"/>
           </a:p>
@@ -3262,7 +3262,7 @@
           <a:p>
             <a:fld id="{D3A355B2-7500-CE40-A57A-2B06713DAC87}" type="datetimeFigureOut">
               <a:rPr lang="en-US" smtClean="0"/>
-              <a:t>7/26/23</a:t>
+              <a:t>7/27/23</a:t>
             </a:fld>
             <a:endParaRPr lang="en-US"/>
           </a:p>
@@ -3551,7 +3551,7 @@
           <a:p>
             <a:fld id="{D3A355B2-7500-CE40-A57A-2B06713DAC87}" type="datetimeFigureOut">
               <a:rPr lang="en-US" smtClean="0"/>
-              <a:t>7/26/23</a:t>
+              <a:t>7/27/23</a:t>
             </a:fld>
             <a:endParaRPr lang="en-US"/>
           </a:p>
@@ -3794,7 +3794,7 @@
           <a:p>
             <a:fld id="{D3A355B2-7500-CE40-A57A-2B06713DAC87}" type="datetimeFigureOut">
               <a:rPr lang="en-US" smtClean="0"/>
-              <a:t>7/26/23</a:t>
+              <a:t>7/27/23</a:t>
             </a:fld>
             <a:endParaRPr lang="en-US"/>
           </a:p>
@@ -4335,6 +4335,29 @@
           <a:bodyPr/>
           <a:lstStyle/>
           <a:p>
+            <a:r>
+              <a:rPr lang="en-US" dirty="0" err="1"/>
+              <a:t>Alexandru</a:t>
+            </a:r>
+            <a:r>
+              <a:rPr lang="en-US" dirty="0"/>
+              <a:t> </a:t>
+            </a:r>
+            <a:r>
+              <a:rPr lang="en-US" dirty="0" err="1"/>
+              <a:t>Radovici</a:t>
+            </a:r>
+            <a:endParaRPr lang="en-US" dirty="0"/>
+          </a:p>
+          <a:p>
+            <a:r>
+              <a:rPr lang="en-US" dirty="0" err="1"/>
+              <a:t>Tockworld</a:t>
+            </a:r>
+            <a:r>
+              <a:rPr lang="en-US" dirty="0"/>
+              <a:t> 6 - 2023</a:t>
+            </a:r>
             <a:endParaRPr lang="en-RO"/>
           </a:p>
         </p:txBody>

</xml_diff>